<commit_message>
cambios validaciones, i18n y facelets
</commit_message>
<xml_diff>
--- a/_18_JSF/powerpoint/JSF - 6 - Internacionalizacion.pptx
+++ b/_18_JSF/powerpoint/JSF - 6 - Internacionalizacion.pptx
@@ -396,7 +396,7 @@
               <a:pPr>
                 <a:defRPr/>
               </a:pPr>
-              <a:t>19/10/2022</a:t>
+              <a:t>02/11/2022</a:t>
             </a:fld>
             <a:endParaRPr lang="es-ES"/>
           </a:p>
@@ -586,7 +586,7 @@
               <a:pPr>
                 <a:defRPr/>
               </a:pPr>
-              <a:t>19/10/2022</a:t>
+              <a:t>02/11/2022</a:t>
             </a:fld>
             <a:endParaRPr lang="es-ES"/>
           </a:p>
@@ -786,7 +786,7 @@
               <a:pPr>
                 <a:defRPr/>
               </a:pPr>
-              <a:t>19/10/2022</a:t>
+              <a:t>02/11/2022</a:t>
             </a:fld>
             <a:endParaRPr lang="es-ES"/>
           </a:p>
@@ -3333,7 +3333,7 @@
               <a:pPr>
                 <a:defRPr/>
               </a:pPr>
-              <a:t>19/10/2022</a:t>
+              <a:t>02/11/2022</a:t>
             </a:fld>
             <a:endParaRPr lang="es-ES"/>
           </a:p>
@@ -4337,7 +4337,7 @@
               <a:pPr>
                 <a:defRPr/>
               </a:pPr>
-              <a:t>19/10/2022</a:t>
+              <a:t>02/11/2022</a:t>
             </a:fld>
             <a:endParaRPr lang="es-ES"/>
           </a:p>
@@ -4644,7 +4644,7 @@
               <a:pPr>
                 <a:defRPr/>
               </a:pPr>
-              <a:t>19/10/2022</a:t>
+              <a:t>02/11/2022</a:t>
             </a:fld>
             <a:endParaRPr lang="es-ES"/>
           </a:p>
@@ -5085,7 +5085,7 @@
               <a:pPr>
                 <a:defRPr/>
               </a:pPr>
-              <a:t>19/10/2022</a:t>
+              <a:t>02/11/2022</a:t>
             </a:fld>
             <a:endParaRPr lang="es-ES"/>
           </a:p>
@@ -5224,7 +5224,7 @@
               <a:pPr>
                 <a:defRPr/>
               </a:pPr>
-              <a:t>19/10/2022</a:t>
+              <a:t>02/11/2022</a:t>
             </a:fld>
             <a:endParaRPr lang="es-ES"/>
           </a:p>
@@ -5341,7 +5341,7 @@
               <a:pPr>
                 <a:defRPr/>
               </a:pPr>
-              <a:t>19/10/2022</a:t>
+              <a:t>02/11/2022</a:t>
             </a:fld>
             <a:endParaRPr lang="es-ES"/>
           </a:p>
@@ -5638,7 +5638,7 @@
               <a:pPr>
                 <a:defRPr/>
               </a:pPr>
-              <a:t>19/10/2022</a:t>
+              <a:t>02/11/2022</a:t>
             </a:fld>
             <a:endParaRPr lang="es-ES"/>
           </a:p>
@@ -5915,7 +5915,7 @@
               <a:pPr>
                 <a:defRPr/>
               </a:pPr>
-              <a:t>19/10/2022</a:t>
+              <a:t>02/11/2022</a:t>
             </a:fld>
             <a:endParaRPr lang="es-ES"/>
           </a:p>
@@ -6171,7 +6171,7 @@
               <a:pPr>
                 <a:defRPr/>
               </a:pPr>
-              <a:t>19/10/2022</a:t>
+              <a:t>02/11/2022</a:t>
             </a:fld>
             <a:endParaRPr lang="es-ES"/>
           </a:p>
@@ -6959,7 +6959,7 @@
               <a:pPr>
                 <a:defRPr/>
               </a:pPr>
-              <a:t>19/10/2022</a:t>
+              <a:t>02/11/2022</a:t>
             </a:fld>
             <a:endParaRPr lang="es-ES"/>
           </a:p>
@@ -7926,16 +7926,65 @@
           <a:p>
             <a:pPr eaLnBrk="1" hangingPunct="1"/>
             <a:r>
-              <a:rPr lang="es-ES"/>
+              <a:rPr lang="es-ES" dirty="0"/>
               <a:t>Mecanismo estándar para la traducción de páginas sin generar contenidos distintos.</a:t>
             </a:r>
           </a:p>
           <a:p>
             <a:pPr eaLnBrk="1" hangingPunct="1"/>
             <a:r>
-              <a:rPr lang="es-ES"/>
+              <a:rPr lang="es-ES" dirty="0"/>
               <a:t>Soporte para múltiples “locales”.</a:t>
             </a:r>
+          </a:p>
+          <a:p>
+            <a:pPr eaLnBrk="1" hangingPunct="1"/>
+            <a:r>
+              <a:rPr lang="es-ES" dirty="0"/>
+              <a:t>Se basa en </a:t>
+            </a:r>
+            <a:r>
+              <a:rPr lang="es-ES" dirty="0" err="1"/>
+              <a:t>estandarés</a:t>
+            </a:r>
+            <a:r>
+              <a:rPr lang="es-ES" dirty="0"/>
+              <a:t>:</a:t>
+            </a:r>
+          </a:p>
+          <a:p>
+            <a:pPr marL="455613" lvl="2" eaLnBrk="1" hangingPunct="1"/>
+            <a:r>
+              <a:rPr lang="es-ES" sz="2200" dirty="0"/>
+              <a:t>ISO 639-1: Consiste en 184 códigos de dos letras usados para identificar los principales </a:t>
+            </a:r>
+            <a:r>
+              <a:rPr lang="es-ES" sz="2200" b="1" dirty="0"/>
+              <a:t>idiomas</a:t>
+            </a:r>
+            <a:r>
+              <a:rPr lang="es-ES" sz="2200" dirty="0"/>
+              <a:t> del mundo.</a:t>
+            </a:r>
+          </a:p>
+          <a:p>
+            <a:pPr marL="455613" lvl="2" eaLnBrk="1" hangingPunct="1"/>
+            <a:r>
+              <a:rPr lang="es-ES" sz="2200" dirty="0"/>
+              <a:t>ISO 3166-1: Consiste en el código de dos letras para identificar </a:t>
+            </a:r>
+            <a:r>
+              <a:rPr lang="es-ES" sz="2200" b="1" dirty="0"/>
+              <a:t>el país</a:t>
+            </a:r>
+            <a:r>
+              <a:rPr lang="es-ES" sz="2200" dirty="0"/>
+              <a:t>.</a:t>
+            </a:r>
+          </a:p>
+          <a:p>
+            <a:pPr lvl="1" eaLnBrk="1" hangingPunct="1"/>
+            <a:endParaRPr lang="es-ES" dirty="0"/>
           </a:p>
         </p:txBody>
       </p:sp>
@@ -8087,20 +8136,48 @@
               <a:t>Locale</a:t>
             </a:r>
             <a:r>
+              <a:rPr lang="es-ES" b="1" dirty="0"/>
+              <a:t> </a:t>
+            </a:r>
+            <a:r>
               <a:rPr lang="es-ES" dirty="0"/>
-              <a:t> y los </a:t>
+              <a:t>(con la </a:t>
             </a:r>
             <a:r>
               <a:rPr lang="es-ES" b="1" dirty="0" err="1"/>
-              <a:t>Supported</a:t>
+              <a:t>iso</a:t>
             </a:r>
             <a:r>
               <a:rPr lang="es-ES" b="1" dirty="0"/>
-              <a:t> Locales </a:t>
+              <a:t> 639-1 y ISO 3166-1 </a:t>
             </a:r>
             <a:r>
               <a:rPr lang="es-ES" dirty="0"/>
-              <a:t>en el faces_config.xml.</a:t>
+              <a:t>queramos) y el paquete donde se van a encontrar los literales con los distintos idiomas</a:t>
+            </a:r>
+            <a:r>
+              <a:rPr lang="es-ES" b="1" dirty="0"/>
+              <a:t> </a:t>
+            </a:r>
+            <a:r>
+              <a:rPr lang="es-ES" dirty="0"/>
+              <a:t>en el </a:t>
+            </a:r>
+            <a:r>
+              <a:rPr lang="es-ES" b="1" dirty="0"/>
+              <a:t>faces_config.xml </a:t>
+            </a:r>
+            <a:r>
+              <a:rPr lang="es-ES" dirty="0"/>
+              <a:t>junto con la variable de acceso al recurso. Ojo, el base </a:t>
+            </a:r>
+            <a:r>
+              <a:rPr lang="es-ES" dirty="0" err="1"/>
+              <a:t>name</a:t>
+            </a:r>
+            <a:r>
+              <a:rPr lang="es-ES" dirty="0"/>
+              <a:t> tiene que estar dentro de un paquete.</a:t>
             </a:r>
           </a:p>
         </p:txBody>
@@ -8176,7 +8253,7 @@
         </p:nvSpPr>
         <p:spPr bwMode="auto">
           <a:xfrm>
-            <a:off x="1281113" y="2820988"/>
+            <a:off x="1204912" y="4038803"/>
             <a:ext cx="6734175" cy="2273300"/>
           </a:xfrm>
           <a:prstGeom prst="rect">
@@ -8238,7 +8315,15 @@
             </a:r>
             <a:r>
               <a:rPr lang="es-ES" sz="1600" dirty="0"/>
-              <a:t>&gt;es&lt;/default-</a:t>
+              <a:t>&gt;</a:t>
+            </a:r>
+            <a:r>
+              <a:rPr lang="es-ES" sz="1600" dirty="0" err="1"/>
+              <a:t>es_ES</a:t>
+            </a:r>
+            <a:r>
+              <a:rPr lang="es-ES" sz="1600" dirty="0"/>
+              <a:t>&lt;/default-</a:t>
             </a:r>
             <a:r>
               <a:rPr lang="es-ES" sz="1600" dirty="0" err="1"/>

</xml_diff>